<commit_message>
Add monotonic constraint references (#5)
* update environment file: seaborn

* add detail information and links for monotonic constraints

* add references for lightgbm and xgboost

* improve image

---------

Co-authored-by: U121417 <U121417@mobi.ch>
</commit_message>
<xml_diff>
--- a/schemata.pptx
+++ b/schemata.pptx
@@ -112,6 +112,35 @@
 </p:presentation>
 </file>
 
+<file path=ppt/changesInfos/changesInfo1.xml><?xml version="1.0" encoding="utf-8"?>
+<pc:chgInfo xmlns:a="http://schemas.openxmlformats.org/drawingml/2006/main" xmlns:r="http://schemas.openxmlformats.org/officeDocument/2006/relationships" xmlns:ac="http://schemas.microsoft.com/office/drawing/2013/main/command" xmlns:pc="http://schemas.microsoft.com/office/powerpoint/2013/main/command">
+  <pc:docChgLst>
+    <pc:chgData name="Flückiger Samuel" userId="37df7d65-7ff3-4e64-b9f8-67eaa796cf2d" providerId="ADAL" clId="{EBFE240B-D771-409F-80AB-20E5223B6B37}"/>
+    <pc:docChg chg="modSld">
+      <pc:chgData name="Flückiger Samuel" userId="37df7d65-7ff3-4e64-b9f8-67eaa796cf2d" providerId="ADAL" clId="{EBFE240B-D771-409F-80AB-20E5223B6B37}" dt="2024-02-05T08:13:26.110" v="1" actId="20577"/>
+      <pc:docMkLst>
+        <pc:docMk/>
+      </pc:docMkLst>
+      <pc:sldChg chg="modSp mod">
+        <pc:chgData name="Flückiger Samuel" userId="37df7d65-7ff3-4e64-b9f8-67eaa796cf2d" providerId="ADAL" clId="{EBFE240B-D771-409F-80AB-20E5223B6B37}" dt="2024-02-05T08:13:26.110" v="1" actId="20577"/>
+        <pc:sldMkLst>
+          <pc:docMk/>
+          <pc:sldMk cId="825494932" sldId="268"/>
+        </pc:sldMkLst>
+        <pc:spChg chg="mod">
+          <ac:chgData name="Flückiger Samuel" userId="37df7d65-7ff3-4e64-b9f8-67eaa796cf2d" providerId="ADAL" clId="{EBFE240B-D771-409F-80AB-20E5223B6B37}" dt="2024-02-05T08:13:26.110" v="1" actId="20577"/>
+          <ac:spMkLst>
+            <pc:docMk/>
+            <pc:sldMk cId="825494932" sldId="268"/>
+            <ac:spMk id="19" creationId="{FBFAEAAD-D3AA-6C61-EC81-B6391C2CC4AF}"/>
+          </ac:spMkLst>
+        </pc:spChg>
+      </pc:sldChg>
+    </pc:docChg>
+  </pc:docChgLst>
+</pc:chgInfo>
+</file>
+
 <file path=ppt/slideLayouts/slideLayout1.xml><?xml version="1.0" encoding="utf-8"?>
 <p:sldLayout xmlns:a="http://schemas.openxmlformats.org/drawingml/2006/main" xmlns:r="http://schemas.openxmlformats.org/officeDocument/2006/relationships" xmlns:p="http://schemas.openxmlformats.org/presentationml/2006/main" type="title" preserve="1">
   <p:cSld name="Titelfolie">
@@ -261,7 +290,7 @@
           <a:p>
             <a:fld id="{C7E3D471-3343-4ACD-800F-D4F45885580E}" type="datetimeFigureOut">
               <a:rPr lang="de-CH" smtClean="0"/>
-              <a:t>16.01.2024</a:t>
+              <a:t>05.02.2024</a:t>
             </a:fld>
             <a:endParaRPr lang="de-CH"/>
           </a:p>
@@ -461,7 +490,7 @@
           <a:p>
             <a:fld id="{C7E3D471-3343-4ACD-800F-D4F45885580E}" type="datetimeFigureOut">
               <a:rPr lang="de-CH" smtClean="0"/>
-              <a:t>16.01.2024</a:t>
+              <a:t>05.02.2024</a:t>
             </a:fld>
             <a:endParaRPr lang="de-CH"/>
           </a:p>
@@ -671,7 +700,7 @@
           <a:p>
             <a:fld id="{C7E3D471-3343-4ACD-800F-D4F45885580E}" type="datetimeFigureOut">
               <a:rPr lang="de-CH" smtClean="0"/>
-              <a:t>16.01.2024</a:t>
+              <a:t>05.02.2024</a:t>
             </a:fld>
             <a:endParaRPr lang="de-CH"/>
           </a:p>
@@ -871,7 +900,7 @@
           <a:p>
             <a:fld id="{C7E3D471-3343-4ACD-800F-D4F45885580E}" type="datetimeFigureOut">
               <a:rPr lang="de-CH" smtClean="0"/>
-              <a:t>16.01.2024</a:t>
+              <a:t>05.02.2024</a:t>
             </a:fld>
             <a:endParaRPr lang="de-CH"/>
           </a:p>
@@ -1147,7 +1176,7 @@
           <a:p>
             <a:fld id="{C7E3D471-3343-4ACD-800F-D4F45885580E}" type="datetimeFigureOut">
               <a:rPr lang="de-CH" smtClean="0"/>
-              <a:t>16.01.2024</a:t>
+              <a:t>05.02.2024</a:t>
             </a:fld>
             <a:endParaRPr lang="de-CH"/>
           </a:p>
@@ -1415,7 +1444,7 @@
           <a:p>
             <a:fld id="{C7E3D471-3343-4ACD-800F-D4F45885580E}" type="datetimeFigureOut">
               <a:rPr lang="de-CH" smtClean="0"/>
-              <a:t>16.01.2024</a:t>
+              <a:t>05.02.2024</a:t>
             </a:fld>
             <a:endParaRPr lang="de-CH"/>
           </a:p>
@@ -1830,7 +1859,7 @@
           <a:p>
             <a:fld id="{C7E3D471-3343-4ACD-800F-D4F45885580E}" type="datetimeFigureOut">
               <a:rPr lang="de-CH" smtClean="0"/>
-              <a:t>16.01.2024</a:t>
+              <a:t>05.02.2024</a:t>
             </a:fld>
             <a:endParaRPr lang="de-CH"/>
           </a:p>
@@ -1972,7 +2001,7 @@
           <a:p>
             <a:fld id="{C7E3D471-3343-4ACD-800F-D4F45885580E}" type="datetimeFigureOut">
               <a:rPr lang="de-CH" smtClean="0"/>
-              <a:t>16.01.2024</a:t>
+              <a:t>05.02.2024</a:t>
             </a:fld>
             <a:endParaRPr lang="de-CH"/>
           </a:p>
@@ -2085,7 +2114,7 @@
           <a:p>
             <a:fld id="{C7E3D471-3343-4ACD-800F-D4F45885580E}" type="datetimeFigureOut">
               <a:rPr lang="de-CH" smtClean="0"/>
-              <a:t>16.01.2024</a:t>
+              <a:t>05.02.2024</a:t>
             </a:fld>
             <a:endParaRPr lang="de-CH"/>
           </a:p>
@@ -2398,7 +2427,7 @@
           <a:p>
             <a:fld id="{C7E3D471-3343-4ACD-800F-D4F45885580E}" type="datetimeFigureOut">
               <a:rPr lang="de-CH" smtClean="0"/>
-              <a:t>16.01.2024</a:t>
+              <a:t>05.02.2024</a:t>
             </a:fld>
             <a:endParaRPr lang="de-CH"/>
           </a:p>
@@ -2687,7 +2716,7 @@
           <a:p>
             <a:fld id="{C7E3D471-3343-4ACD-800F-D4F45885580E}" type="datetimeFigureOut">
               <a:rPr lang="de-CH" smtClean="0"/>
-              <a:t>16.01.2024</a:t>
+              <a:t>05.02.2024</a:t>
             </a:fld>
             <a:endParaRPr lang="de-CH"/>
           </a:p>
@@ -2930,7 +2959,7 @@
           <a:p>
             <a:fld id="{C7E3D471-3343-4ACD-800F-D4F45885580E}" type="datetimeFigureOut">
               <a:rPr lang="de-CH" smtClean="0"/>
-              <a:t>16.01.2024</a:t>
+              <a:t>05.02.2024</a:t>
             </a:fld>
             <a:endParaRPr lang="de-CH"/>
           </a:p>
@@ -4163,8 +4192,8 @@
           </a:fontRef>
         </p:style>
       </p:cxnSp>
-      <mc:AlternateContent xmlns:mc="http://schemas.openxmlformats.org/markup-compatibility/2006">
-        <mc:Choice xmlns:a14="http://schemas.microsoft.com/office/drawing/2010/main" Requires="a14">
+      <mc:AlternateContent xmlns:mc="http://schemas.openxmlformats.org/markup-compatibility/2006" xmlns:a14="http://schemas.microsoft.com/office/drawing/2010/main">
+        <mc:Choice Requires="a14">
           <p:sp>
             <p:nvSpPr>
               <p:cNvPr id="10" name="Textfeld 9">
@@ -4244,13 +4273,7 @@
                         <a:rPr lang="de-CH" b="0" i="1" dirty="0" smtClean="0">
                           <a:latin typeface="Cambria Math" panose="02040503050406030204" pitchFamily="18" charset="0"/>
                         </a:rPr>
-                        <m:t>=</m:t>
-                      </m:r>
-                      <m:r>
-                        <a:rPr lang="de-CH" b="0" i="1" dirty="0" smtClean="0">
-                          <a:latin typeface="Cambria Math" panose="02040503050406030204" pitchFamily="18" charset="0"/>
-                        </a:rPr>
-                        <m:t>0.1</m:t>
+                        <m:t>=0.1</m:t>
                       </m:r>
                     </m:oMath>
                   </m:oMathPara>
@@ -4305,7 +4328,7 @@
             </p:txBody>
           </p:sp>
         </mc:Choice>
-        <mc:Fallback>
+        <mc:Fallback xmlns="">
           <p:sp>
             <p:nvSpPr>
               <p:cNvPr id="10" name="Textfeld 9">
@@ -4462,7 +4485,7 @@
         <p:spPr>
           <a:xfrm>
             <a:off x="6858198" y="4652566"/>
-            <a:ext cx="899605" cy="369332"/>
+            <a:ext cx="872034" cy="369332"/>
           </a:xfrm>
           <a:prstGeom prst="rect">
             <a:avLst/>
@@ -4476,8 +4499,12 @@
           <a:lstStyle/>
           <a:p>
             <a:r>
-              <a:rPr lang="de-CH" dirty="0" err="1"/>
-              <a:t>Capped</a:t>
+              <a:rPr lang="de-CH" dirty="0"/>
+              <a:t>c</a:t>
+            </a:r>
+            <a:r>
+              <a:rPr lang="de-CH"/>
+              <a:t>apped</a:t>
             </a:r>
             <a:endParaRPr lang="de-CH" dirty="0"/>
           </a:p>

</xml_diff>